<commit_message>
Joel desktop to Wendian
</commit_message>
<xml_diff>
--- a/GeometryParameters.pptx
+++ b/GeometryParameters.pptx
@@ -7,6 +7,7 @@
   <p:sldIdLst>
     <p:sldId id="256" r:id="rId2"/>
     <p:sldId id="257" r:id="rId3"/>
+    <p:sldId id="258" r:id="rId4"/>
   </p:sldIdLst>
   <p:sldSz cx="12192000" cy="6858000"/>
   <p:notesSz cx="6858000" cy="9144000"/>
@@ -260,7 +261,7 @@
           <a:p>
             <a:fld id="{7BAF3AAC-7B71-4445-8DBF-CFC93812CBF0}" type="datetimeFigureOut">
               <a:rPr lang="en-US" smtClean="0"/>
-              <a:t>11/13/2020</a:t>
+              <a:t>5/17/2021</a:t>
             </a:fld>
             <a:endParaRPr lang="en-US"/>
           </a:p>
@@ -458,7 +459,7 @@
           <a:p>
             <a:fld id="{7BAF3AAC-7B71-4445-8DBF-CFC93812CBF0}" type="datetimeFigureOut">
               <a:rPr lang="en-US" smtClean="0"/>
-              <a:t>11/13/2020</a:t>
+              <a:t>5/17/2021</a:t>
             </a:fld>
             <a:endParaRPr lang="en-US"/>
           </a:p>
@@ -666,7 +667,7 @@
           <a:p>
             <a:fld id="{7BAF3AAC-7B71-4445-8DBF-CFC93812CBF0}" type="datetimeFigureOut">
               <a:rPr lang="en-US" smtClean="0"/>
-              <a:t>11/13/2020</a:t>
+              <a:t>5/17/2021</a:t>
             </a:fld>
             <a:endParaRPr lang="en-US"/>
           </a:p>
@@ -864,7 +865,7 @@
           <a:p>
             <a:fld id="{7BAF3AAC-7B71-4445-8DBF-CFC93812CBF0}" type="datetimeFigureOut">
               <a:rPr lang="en-US" smtClean="0"/>
-              <a:t>11/13/2020</a:t>
+              <a:t>5/17/2021</a:t>
             </a:fld>
             <a:endParaRPr lang="en-US"/>
           </a:p>
@@ -1139,7 +1140,7 @@
           <a:p>
             <a:fld id="{7BAF3AAC-7B71-4445-8DBF-CFC93812CBF0}" type="datetimeFigureOut">
               <a:rPr lang="en-US" smtClean="0"/>
-              <a:t>11/13/2020</a:t>
+              <a:t>5/17/2021</a:t>
             </a:fld>
             <a:endParaRPr lang="en-US"/>
           </a:p>
@@ -1404,7 +1405,7 @@
           <a:p>
             <a:fld id="{7BAF3AAC-7B71-4445-8DBF-CFC93812CBF0}" type="datetimeFigureOut">
               <a:rPr lang="en-US" smtClean="0"/>
-              <a:t>11/13/2020</a:t>
+              <a:t>5/17/2021</a:t>
             </a:fld>
             <a:endParaRPr lang="en-US"/>
           </a:p>
@@ -1816,7 +1817,7 @@
           <a:p>
             <a:fld id="{7BAF3AAC-7B71-4445-8DBF-CFC93812CBF0}" type="datetimeFigureOut">
               <a:rPr lang="en-US" smtClean="0"/>
-              <a:t>11/13/2020</a:t>
+              <a:t>5/17/2021</a:t>
             </a:fld>
             <a:endParaRPr lang="en-US"/>
           </a:p>
@@ -1957,7 +1958,7 @@
           <a:p>
             <a:fld id="{7BAF3AAC-7B71-4445-8DBF-CFC93812CBF0}" type="datetimeFigureOut">
               <a:rPr lang="en-US" smtClean="0"/>
-              <a:t>11/13/2020</a:t>
+              <a:t>5/17/2021</a:t>
             </a:fld>
             <a:endParaRPr lang="en-US"/>
           </a:p>
@@ -2070,7 +2071,7 @@
           <a:p>
             <a:fld id="{7BAF3AAC-7B71-4445-8DBF-CFC93812CBF0}" type="datetimeFigureOut">
               <a:rPr lang="en-US" smtClean="0"/>
-              <a:t>11/13/2020</a:t>
+              <a:t>5/17/2021</a:t>
             </a:fld>
             <a:endParaRPr lang="en-US"/>
           </a:p>
@@ -2381,7 +2382,7 @@
           <a:p>
             <a:fld id="{7BAF3AAC-7B71-4445-8DBF-CFC93812CBF0}" type="datetimeFigureOut">
               <a:rPr lang="en-US" smtClean="0"/>
-              <a:t>11/13/2020</a:t>
+              <a:t>5/17/2021</a:t>
             </a:fld>
             <a:endParaRPr lang="en-US"/>
           </a:p>
@@ -2669,7 +2670,7 @@
           <a:p>
             <a:fld id="{7BAF3AAC-7B71-4445-8DBF-CFC93812CBF0}" type="datetimeFigureOut">
               <a:rPr lang="en-US" smtClean="0"/>
-              <a:t>11/13/2020</a:t>
+              <a:t>5/17/2021</a:t>
             </a:fld>
             <a:endParaRPr lang="en-US"/>
           </a:p>
@@ -2910,7 +2911,7 @@
           <a:p>
             <a:fld id="{7BAF3AAC-7B71-4445-8DBF-CFC93812CBF0}" type="datetimeFigureOut">
               <a:rPr lang="en-US" smtClean="0"/>
-              <a:t>11/13/2020</a:t>
+              <a:t>5/17/2021</a:t>
             </a:fld>
             <a:endParaRPr lang="en-US"/>
           </a:p>
@@ -4352,9 +4353,9 @@
           <p:nvPr/>
         </p:nvSpPr>
         <p:spPr>
-          <a:xfrm>
-            <a:off x="5722880" y="3446606"/>
-            <a:ext cx="128816" cy="138724"/>
+          <a:xfrm flipV="1">
+            <a:off x="5810889" y="3415151"/>
+            <a:ext cx="131334" cy="127039"/>
           </a:xfrm>
           <a:prstGeom prst="ellipse">
             <a:avLst/>
@@ -7618,6 +7619,605 @@
     <p:extLst>
       <p:ext uri="{BB962C8B-B14F-4D97-AF65-F5344CB8AC3E}">
         <p14:creationId xmlns:p14="http://schemas.microsoft.com/office/powerpoint/2010/main" val="2077644522"/>
+      </p:ext>
+    </p:extLst>
+  </p:cSld>
+  <p:clrMapOvr>
+    <a:masterClrMapping/>
+  </p:clrMapOvr>
+</p:sld>
+</file>
+
+<file path=ppt/slides/slide3.xml><?xml version="1.0" encoding="utf-8"?>
+<p:sld xmlns:a="http://schemas.openxmlformats.org/drawingml/2006/main" xmlns:r="http://schemas.openxmlformats.org/officeDocument/2006/relationships" xmlns:p="http://schemas.openxmlformats.org/presentationml/2006/main">
+  <p:cSld>
+    <p:spTree>
+      <p:nvGrpSpPr>
+        <p:cNvPr id="1" name=""/>
+        <p:cNvGrpSpPr/>
+        <p:nvPr/>
+      </p:nvGrpSpPr>
+      <p:grpSpPr>
+        <a:xfrm>
+          <a:off x="0" y="0"/>
+          <a:ext cx="0" cy="0"/>
+          <a:chOff x="0" y="0"/>
+          <a:chExt cx="0" cy="0"/>
+        </a:xfrm>
+      </p:grpSpPr>
+      <p:pic>
+        <p:nvPicPr>
+          <p:cNvPr id="4" name="Picture 3">
+            <a:extLst>
+              <a:ext uri="{FF2B5EF4-FFF2-40B4-BE49-F238E27FC236}">
+                <a16:creationId xmlns:a16="http://schemas.microsoft.com/office/drawing/2014/main" id="{E56DB3D7-4A81-4872-B36E-CF1C84730DC7}"/>
+              </a:ext>
+            </a:extLst>
+          </p:cNvPr>
+          <p:cNvPicPr>
+            <a:picLocks noChangeAspect="1"/>
+          </p:cNvPicPr>
+          <p:nvPr/>
+        </p:nvPicPr>
+        <p:blipFill>
+          <a:blip r:embed="rId2"/>
+          <a:stretch>
+            <a:fillRect/>
+          </a:stretch>
+        </p:blipFill>
+        <p:spPr>
+          <a:xfrm rot="5400000">
+            <a:off x="4075465" y="-1842073"/>
+            <a:ext cx="5621783" cy="10611287"/>
+          </a:xfrm>
+          <a:prstGeom prst="rect">
+            <a:avLst/>
+          </a:prstGeom>
+        </p:spPr>
+      </p:pic>
+      <p:cxnSp>
+        <p:nvCxnSpPr>
+          <p:cNvPr id="6" name="Straight Arrow Connector 5">
+            <a:extLst>
+              <a:ext uri="{FF2B5EF4-FFF2-40B4-BE49-F238E27FC236}">
+                <a16:creationId xmlns:a16="http://schemas.microsoft.com/office/drawing/2014/main" id="{F7C01F67-77E4-4C69-8B0A-0BA570BECDB1}"/>
+              </a:ext>
+            </a:extLst>
+          </p:cNvPr>
+          <p:cNvCxnSpPr>
+            <a:cxnSpLocks/>
+          </p:cNvCxnSpPr>
+          <p:nvPr/>
+        </p:nvCxnSpPr>
+        <p:spPr>
+          <a:xfrm>
+            <a:off x="10961639" y="2414187"/>
+            <a:ext cx="898928" cy="355646"/>
+          </a:xfrm>
+          <a:prstGeom prst="straightConnector1">
+            <a:avLst/>
+          </a:prstGeom>
+          <a:ln>
+            <a:tailEnd type="triangle"/>
+          </a:ln>
+        </p:spPr>
+        <p:style>
+          <a:lnRef idx="1">
+            <a:schemeClr val="accent1"/>
+          </a:lnRef>
+          <a:fillRef idx="0">
+            <a:schemeClr val="accent1"/>
+          </a:fillRef>
+          <a:effectRef idx="0">
+            <a:schemeClr val="accent1"/>
+          </a:effectRef>
+          <a:fontRef idx="minor">
+            <a:schemeClr val="tx1"/>
+          </a:fontRef>
+        </p:style>
+      </p:cxnSp>
+      <p:sp>
+        <p:nvSpPr>
+          <p:cNvPr id="7" name="TextBox 6">
+            <a:extLst>
+              <a:ext uri="{FF2B5EF4-FFF2-40B4-BE49-F238E27FC236}">
+                <a16:creationId xmlns:a16="http://schemas.microsoft.com/office/drawing/2014/main" id="{A7793668-0A2A-4514-AA00-8B7AC8887AF1}"/>
+              </a:ext>
+            </a:extLst>
+          </p:cNvPr>
+          <p:cNvSpPr txBox="1"/>
+          <p:nvPr/>
+        </p:nvSpPr>
+        <p:spPr>
+          <a:xfrm>
+            <a:off x="10260934" y="2229521"/>
+            <a:ext cx="529184" cy="276999"/>
+          </a:xfrm>
+          <a:prstGeom prst="rect">
+            <a:avLst/>
+          </a:prstGeom>
+          <a:noFill/>
+        </p:spPr>
+        <p:txBody>
+          <a:bodyPr wrap="none" rtlCol="0">
+            <a:spAutoFit/>
+          </a:bodyPr>
+          <a:lstStyle/>
+          <a:p>
+            <a:r>
+              <a:rPr lang="en-US" sz="1200"/>
+              <a:t>Pad 1</a:t>
+            </a:r>
+          </a:p>
+        </p:txBody>
+      </p:sp>
+      <p:sp>
+        <p:nvSpPr>
+          <p:cNvPr id="10" name="TextBox 9">
+            <a:extLst>
+              <a:ext uri="{FF2B5EF4-FFF2-40B4-BE49-F238E27FC236}">
+                <a16:creationId xmlns:a16="http://schemas.microsoft.com/office/drawing/2014/main" id="{779DFA9D-EEEB-4130-A635-9F84C95101E1}"/>
+              </a:ext>
+            </a:extLst>
+          </p:cNvPr>
+          <p:cNvSpPr txBox="1"/>
+          <p:nvPr/>
+        </p:nvSpPr>
+        <p:spPr>
+          <a:xfrm>
+            <a:off x="2683166" y="6274462"/>
+            <a:ext cx="529184" cy="276999"/>
+          </a:xfrm>
+          <a:prstGeom prst="rect">
+            <a:avLst/>
+          </a:prstGeom>
+          <a:noFill/>
+        </p:spPr>
+        <p:txBody>
+          <a:bodyPr wrap="none" rtlCol="0">
+            <a:spAutoFit/>
+          </a:bodyPr>
+          <a:lstStyle/>
+          <a:p>
+            <a:r>
+              <a:rPr lang="en-US" sz="1200"/>
+              <a:t>Pad 2</a:t>
+            </a:r>
+          </a:p>
+        </p:txBody>
+      </p:sp>
+      <p:cxnSp>
+        <p:nvCxnSpPr>
+          <p:cNvPr id="11" name="Straight Arrow Connector 10">
+            <a:extLst>
+              <a:ext uri="{FF2B5EF4-FFF2-40B4-BE49-F238E27FC236}">
+                <a16:creationId xmlns:a16="http://schemas.microsoft.com/office/drawing/2014/main" id="{2B47C721-34F7-4629-9F4A-BB4D7853D0BD}"/>
+              </a:ext>
+            </a:extLst>
+          </p:cNvPr>
+          <p:cNvCxnSpPr>
+            <a:cxnSpLocks/>
+          </p:cNvCxnSpPr>
+          <p:nvPr/>
+        </p:nvCxnSpPr>
+        <p:spPr>
+          <a:xfrm flipH="1" flipV="1">
+            <a:off x="2183907" y="5601810"/>
+            <a:ext cx="697684" cy="754315"/>
+          </a:xfrm>
+          <a:prstGeom prst="straightConnector1">
+            <a:avLst/>
+          </a:prstGeom>
+          <a:ln>
+            <a:tailEnd type="triangle"/>
+          </a:ln>
+        </p:spPr>
+        <p:style>
+          <a:lnRef idx="1">
+            <a:schemeClr val="accent1"/>
+          </a:lnRef>
+          <a:fillRef idx="0">
+            <a:schemeClr val="accent1"/>
+          </a:fillRef>
+          <a:effectRef idx="0">
+            <a:schemeClr val="accent1"/>
+          </a:effectRef>
+          <a:fontRef idx="minor">
+            <a:schemeClr val="tx1"/>
+          </a:fontRef>
+        </p:style>
+      </p:cxnSp>
+      <p:cxnSp>
+        <p:nvCxnSpPr>
+          <p:cNvPr id="15" name="Straight Arrow Connector 14">
+            <a:extLst>
+              <a:ext uri="{FF2B5EF4-FFF2-40B4-BE49-F238E27FC236}">
+                <a16:creationId xmlns:a16="http://schemas.microsoft.com/office/drawing/2014/main" id="{BF891B75-A15B-4407-9F48-1A5DDE686A7A}"/>
+              </a:ext>
+            </a:extLst>
+          </p:cNvPr>
+          <p:cNvCxnSpPr>
+            <a:cxnSpLocks/>
+          </p:cNvCxnSpPr>
+          <p:nvPr/>
+        </p:nvCxnSpPr>
+        <p:spPr>
+          <a:xfrm>
+            <a:off x="9312676" y="3556302"/>
+            <a:ext cx="2547891" cy="0"/>
+          </a:xfrm>
+          <a:prstGeom prst="straightConnector1">
+            <a:avLst/>
+          </a:prstGeom>
+          <a:ln>
+            <a:headEnd type="triangle"/>
+            <a:tailEnd type="triangle"/>
+          </a:ln>
+        </p:spPr>
+        <p:style>
+          <a:lnRef idx="1">
+            <a:schemeClr val="accent1"/>
+          </a:lnRef>
+          <a:fillRef idx="0">
+            <a:schemeClr val="accent1"/>
+          </a:fillRef>
+          <a:effectRef idx="0">
+            <a:schemeClr val="accent1"/>
+          </a:effectRef>
+          <a:fontRef idx="minor">
+            <a:schemeClr val="tx1"/>
+          </a:fontRef>
+        </p:style>
+      </p:cxnSp>
+      <p:sp>
+        <p:nvSpPr>
+          <p:cNvPr id="17" name="TextBox 16">
+            <a:extLst>
+              <a:ext uri="{FF2B5EF4-FFF2-40B4-BE49-F238E27FC236}">
+                <a16:creationId xmlns:a16="http://schemas.microsoft.com/office/drawing/2014/main" id="{4349C508-B0DF-4213-8C90-A0F3AE8B454D}"/>
+              </a:ext>
+            </a:extLst>
+          </p:cNvPr>
+          <p:cNvSpPr txBox="1"/>
+          <p:nvPr/>
+        </p:nvSpPr>
+        <p:spPr>
+          <a:xfrm>
+            <a:off x="9475234" y="3274951"/>
+            <a:ext cx="2385333" cy="276999"/>
+          </a:xfrm>
+          <a:prstGeom prst="rect">
+            <a:avLst/>
+          </a:prstGeom>
+          <a:noFill/>
+        </p:spPr>
+        <p:txBody>
+          <a:bodyPr wrap="none" rtlCol="0">
+            <a:spAutoFit/>
+          </a:bodyPr>
+          <a:lstStyle/>
+          <a:p>
+            <a:r>
+              <a:rPr lang="en-US" sz="1200"/>
+              <a:t>Meander to pad minimum distance</a:t>
+            </a:r>
+          </a:p>
+        </p:txBody>
+      </p:sp>
+      <p:cxnSp>
+        <p:nvCxnSpPr>
+          <p:cNvPr id="19" name="Straight Arrow Connector 18">
+            <a:extLst>
+              <a:ext uri="{FF2B5EF4-FFF2-40B4-BE49-F238E27FC236}">
+                <a16:creationId xmlns:a16="http://schemas.microsoft.com/office/drawing/2014/main" id="{8705B66B-609C-492A-A57F-5A5E5A7CABBB}"/>
+              </a:ext>
+            </a:extLst>
+          </p:cNvPr>
+          <p:cNvCxnSpPr/>
+          <p:nvPr/>
+        </p:nvCxnSpPr>
+        <p:spPr>
+          <a:xfrm flipH="1">
+            <a:off x="2183907" y="3551950"/>
+            <a:ext cx="1367161" cy="0"/>
+          </a:xfrm>
+          <a:prstGeom prst="straightConnector1">
+            <a:avLst/>
+          </a:prstGeom>
+          <a:ln>
+            <a:tailEnd type="triangle"/>
+          </a:ln>
+        </p:spPr>
+        <p:style>
+          <a:lnRef idx="1">
+            <a:schemeClr val="accent1"/>
+          </a:lnRef>
+          <a:fillRef idx="0">
+            <a:schemeClr val="accent1"/>
+          </a:fillRef>
+          <a:effectRef idx="0">
+            <a:schemeClr val="accent1"/>
+          </a:effectRef>
+          <a:fontRef idx="minor">
+            <a:schemeClr val="tx1"/>
+          </a:fontRef>
+        </p:style>
+      </p:cxnSp>
+      <p:cxnSp>
+        <p:nvCxnSpPr>
+          <p:cNvPr id="21" name="Straight Arrow Connector 20">
+            <a:extLst>
+              <a:ext uri="{FF2B5EF4-FFF2-40B4-BE49-F238E27FC236}">
+                <a16:creationId xmlns:a16="http://schemas.microsoft.com/office/drawing/2014/main" id="{370DE151-0968-43D1-8F36-A016394C5BB9}"/>
+              </a:ext>
+            </a:extLst>
+          </p:cNvPr>
+          <p:cNvCxnSpPr/>
+          <p:nvPr/>
+        </p:nvCxnSpPr>
+        <p:spPr>
+          <a:xfrm>
+            <a:off x="3559946" y="3551950"/>
+            <a:ext cx="0" cy="1437300"/>
+          </a:xfrm>
+          <a:prstGeom prst="straightConnector1">
+            <a:avLst/>
+          </a:prstGeom>
+          <a:ln>
+            <a:tailEnd type="triangle"/>
+          </a:ln>
+        </p:spPr>
+        <p:style>
+          <a:lnRef idx="1">
+            <a:schemeClr val="accent1"/>
+          </a:lnRef>
+          <a:fillRef idx="0">
+            <a:schemeClr val="accent1"/>
+          </a:fillRef>
+          <a:effectRef idx="0">
+            <a:schemeClr val="accent1"/>
+          </a:effectRef>
+          <a:fontRef idx="minor">
+            <a:schemeClr val="tx1"/>
+          </a:fontRef>
+        </p:style>
+      </p:cxnSp>
+      <p:sp>
+        <p:nvSpPr>
+          <p:cNvPr id="23" name="Arc 22">
+            <a:extLst>
+              <a:ext uri="{FF2B5EF4-FFF2-40B4-BE49-F238E27FC236}">
+                <a16:creationId xmlns:a16="http://schemas.microsoft.com/office/drawing/2014/main" id="{8AE07486-5E06-4769-B655-39FD4E72C9D0}"/>
+              </a:ext>
+            </a:extLst>
+          </p:cNvPr>
+          <p:cNvSpPr/>
+          <p:nvPr/>
+        </p:nvSpPr>
+        <p:spPr>
+          <a:xfrm rot="10800000">
+            <a:off x="3156075" y="3170211"/>
+            <a:ext cx="736841" cy="763480"/>
+          </a:xfrm>
+          <a:prstGeom prst="arc">
+            <a:avLst/>
+          </a:prstGeom>
+        </p:spPr>
+        <p:style>
+          <a:lnRef idx="1">
+            <a:schemeClr val="accent1"/>
+          </a:lnRef>
+          <a:fillRef idx="0">
+            <a:schemeClr val="accent1"/>
+          </a:fillRef>
+          <a:effectRef idx="0">
+            <a:schemeClr val="accent1"/>
+          </a:effectRef>
+          <a:fontRef idx="minor">
+            <a:schemeClr val="tx1"/>
+          </a:fontRef>
+        </p:style>
+        <p:txBody>
+          <a:bodyPr rtlCol="0" anchor="ctr"/>
+          <a:lstStyle/>
+          <a:p>
+            <a:pPr algn="ctr"/>
+            <a:endParaRPr lang="en-US"/>
+          </a:p>
+        </p:txBody>
+      </p:sp>
+      <p:sp>
+        <p:nvSpPr>
+          <p:cNvPr id="24" name="TextBox 23">
+            <a:extLst>
+              <a:ext uri="{FF2B5EF4-FFF2-40B4-BE49-F238E27FC236}">
+                <a16:creationId xmlns:a16="http://schemas.microsoft.com/office/drawing/2014/main" id="{4E6FFC2A-EEAD-4073-B262-D05F04027234}"/>
+              </a:ext>
+            </a:extLst>
+          </p:cNvPr>
+          <p:cNvSpPr txBox="1"/>
+          <p:nvPr/>
+        </p:nvSpPr>
+        <p:spPr>
+          <a:xfrm>
+            <a:off x="2227332" y="3182618"/>
+            <a:ext cx="1168718" cy="276999"/>
+          </a:xfrm>
+          <a:prstGeom prst="rect">
+            <a:avLst/>
+          </a:prstGeom>
+          <a:noFill/>
+        </p:spPr>
+        <p:txBody>
+          <a:bodyPr wrap="none" rtlCol="0">
+            <a:spAutoFit/>
+          </a:bodyPr>
+          <a:lstStyle/>
+          <a:p>
+            <a:r>
+              <a:rPr lang="en-US" sz="1200"/>
+              <a:t>Pad curve angle</a:t>
+            </a:r>
+          </a:p>
+        </p:txBody>
+      </p:sp>
+      <p:cxnSp>
+        <p:nvCxnSpPr>
+          <p:cNvPr id="26" name="Straight Arrow Connector 25">
+            <a:extLst>
+              <a:ext uri="{FF2B5EF4-FFF2-40B4-BE49-F238E27FC236}">
+                <a16:creationId xmlns:a16="http://schemas.microsoft.com/office/drawing/2014/main" id="{48ACA822-42EF-4AA6-9321-CCA312E0180C}"/>
+              </a:ext>
+            </a:extLst>
+          </p:cNvPr>
+          <p:cNvCxnSpPr>
+            <a:cxnSpLocks/>
+          </p:cNvCxnSpPr>
+          <p:nvPr/>
+        </p:nvCxnSpPr>
+        <p:spPr>
+          <a:xfrm>
+            <a:off x="7128769" y="5211192"/>
+            <a:ext cx="275208" cy="301841"/>
+          </a:xfrm>
+          <a:prstGeom prst="straightConnector1">
+            <a:avLst/>
+          </a:prstGeom>
+          <a:ln>
+            <a:tailEnd type="triangle"/>
+          </a:ln>
+        </p:spPr>
+        <p:style>
+          <a:lnRef idx="1">
+            <a:schemeClr val="accent1"/>
+          </a:lnRef>
+          <a:fillRef idx="0">
+            <a:schemeClr val="accent1"/>
+          </a:fillRef>
+          <a:effectRef idx="0">
+            <a:schemeClr val="accent1"/>
+          </a:effectRef>
+          <a:fontRef idx="minor">
+            <a:schemeClr val="tx1"/>
+          </a:fontRef>
+        </p:style>
+      </p:cxnSp>
+      <p:sp>
+        <p:nvSpPr>
+          <p:cNvPr id="28" name="TextBox 27">
+            <a:extLst>
+              <a:ext uri="{FF2B5EF4-FFF2-40B4-BE49-F238E27FC236}">
+                <a16:creationId xmlns:a16="http://schemas.microsoft.com/office/drawing/2014/main" id="{B703B848-6120-4246-AF3C-9958301D04D7}"/>
+              </a:ext>
+            </a:extLst>
+          </p:cNvPr>
+          <p:cNvSpPr txBox="1"/>
+          <p:nvPr/>
+        </p:nvSpPr>
+        <p:spPr>
+          <a:xfrm>
+            <a:off x="6462944" y="4838330"/>
+            <a:ext cx="1471941" cy="276999"/>
+          </a:xfrm>
+          <a:prstGeom prst="rect">
+            <a:avLst/>
+          </a:prstGeom>
+          <a:noFill/>
+        </p:spPr>
+        <p:txBody>
+          <a:bodyPr wrap="none" rtlCol="0">
+            <a:spAutoFit/>
+          </a:bodyPr>
+          <a:lstStyle/>
+          <a:p>
+            <a:r>
+              <a:rPr lang="en-US" sz="1200"/>
+              <a:t>Meander turn radius</a:t>
+            </a:r>
+          </a:p>
+        </p:txBody>
+      </p:sp>
+      <p:cxnSp>
+        <p:nvCxnSpPr>
+          <p:cNvPr id="29" name="Straight Arrow Connector 28">
+            <a:extLst>
+              <a:ext uri="{FF2B5EF4-FFF2-40B4-BE49-F238E27FC236}">
+                <a16:creationId xmlns:a16="http://schemas.microsoft.com/office/drawing/2014/main" id="{AD61EE8F-AADA-4B14-AEED-C677D5705D51}"/>
+              </a:ext>
+            </a:extLst>
+          </p:cNvPr>
+          <p:cNvCxnSpPr>
+            <a:cxnSpLocks/>
+          </p:cNvCxnSpPr>
+          <p:nvPr/>
+        </p:nvCxnSpPr>
+        <p:spPr>
+          <a:xfrm>
+            <a:off x="204186" y="326310"/>
+            <a:ext cx="11754035" cy="0"/>
+          </a:xfrm>
+          <a:prstGeom prst="straightConnector1">
+            <a:avLst/>
+          </a:prstGeom>
+          <a:ln>
+            <a:headEnd type="triangle"/>
+            <a:tailEnd type="triangle"/>
+          </a:ln>
+        </p:spPr>
+        <p:style>
+          <a:lnRef idx="1">
+            <a:schemeClr val="accent1"/>
+          </a:lnRef>
+          <a:fillRef idx="0">
+            <a:schemeClr val="accent1"/>
+          </a:fillRef>
+          <a:effectRef idx="0">
+            <a:schemeClr val="accent1"/>
+          </a:effectRef>
+          <a:fontRef idx="minor">
+            <a:schemeClr val="tx1"/>
+          </a:fontRef>
+        </p:style>
+      </p:cxnSp>
+      <p:sp>
+        <p:nvSpPr>
+          <p:cNvPr id="32" name="TextBox 31">
+            <a:extLst>
+              <a:ext uri="{FF2B5EF4-FFF2-40B4-BE49-F238E27FC236}">
+                <a16:creationId xmlns:a16="http://schemas.microsoft.com/office/drawing/2014/main" id="{57BEFB2A-0999-455E-8C73-D2CEE2988BBD}"/>
+              </a:ext>
+            </a:extLst>
+          </p:cNvPr>
+          <p:cNvSpPr txBox="1"/>
+          <p:nvPr/>
+        </p:nvSpPr>
+        <p:spPr>
+          <a:xfrm>
+            <a:off x="3892916" y="88777"/>
+            <a:ext cx="2728567" cy="276999"/>
+          </a:xfrm>
+          <a:prstGeom prst="rect">
+            <a:avLst/>
+          </a:prstGeom>
+          <a:noFill/>
+        </p:spPr>
+        <p:txBody>
+          <a:bodyPr wrap="none" rtlCol="0">
+            <a:spAutoFit/>
+          </a:bodyPr>
+          <a:lstStyle/>
+          <a:p>
+            <a:r>
+              <a:rPr lang="en-US" sz="1200"/>
+              <a:t>Pad separation (as if pad 2 were straight)</a:t>
+            </a:r>
+          </a:p>
+        </p:txBody>
+      </p:sp>
+    </p:spTree>
+    <p:extLst>
+      <p:ext uri="{BB962C8B-B14F-4D97-AF65-F5344CB8AC3E}">
+        <p14:creationId xmlns:p14="http://schemas.microsoft.com/office/powerpoint/2010/main" val="3964399887"/>
       </p:ext>
     </p:extLst>
   </p:cSld>

</xml_diff>